<commit_message>
Slides 7 & 8 Officer Practice
</commit_message>
<xml_diff>
--- a/Megha_Slides.pptx
+++ b/Megha_Slides.pptx
@@ -5,16 +5,15 @@
     <p:sldMasterId id="2147483648" r:id="rId1"/>
   </p:sldMasterIdLst>
   <p:notesMasterIdLst>
-    <p:notesMasterId r:id="rId4"/>
+    <p:notesMasterId r:id="rId5"/>
   </p:notesMasterIdLst>
   <p:handoutMasterIdLst>
-    <p:handoutMasterId r:id="rId5"/>
+    <p:handoutMasterId r:id="rId6"/>
   </p:handoutMasterIdLst>
-  <p:sldIdLst xmlns:a="http://schemas.openxmlformats.org/drawingml/2006/main" xmlns:r="http://schemas.openxmlformats.org/officeDocument/2006/relationships" xmlns:p="http://schemas.openxmlformats.org/presentationml/2006/main">
+  <p:sldIdLst>
     <p:sldId id="261" r:id="rId2"/>
-    <p:sldId id="263" r:id="rId3"/>
-    <p:sldId id="264" r:id="rId10"/>
-    <p:sldId id="265" r:id="rId11"/>
+    <p:sldId id="264" r:id="rId3"/>
+    <p:sldId id="265" r:id="rId4"/>
   </p:sldIdLst>
   <p:sldSz cx="9144000" cy="6858000" type="screen4x3"/>
   <p:notesSz cx="6858000" cy="9144000"/>
@@ -4990,18 +4989,18 @@
       </p:grpSpPr>
       <p:sp>
         <p:nvSpPr>
-          <p:cNvPr id="5" name="Slide Number Placeholder 4"/>
+          <p:cNvPr id="2" name="Title 1"/>
           <p:cNvSpPr>
             <a:spLocks noGrp="1"/>
           </p:cNvSpPr>
           <p:nvPr>
-            <p:ph type="sldNum" sz="quarter" idx="12"/>
+            <p:ph type="title"/>
           </p:nvPr>
         </p:nvSpPr>
         <p:spPr>
           <a:xfrm>
-            <a:off x="6553200" y="6245225"/>
-            <a:ext cx="2133600" cy="476250"/>
+            <a:off x="457200" y="457200"/>
+            <a:ext cx="8229600" cy="1143000"/>
           </a:xfrm>
         </p:spPr>
         <p:txBody>
@@ -5009,25 +5008,25 @@
           <a:lstStyle/>
           <a:p>
             <a:r>
-              <a:t>11-2</a:t>
-            </a:r>
-          </a:p>
-        </p:txBody>
-      </p:sp>
-      <p:sp>
-        <p:nvSpPr>
-          <p:cNvPr id="6" name="Footer Placeholder 5"/>
+              <a:t>The Last Bear Market</a:t>
+            </a:r>
+          </a:p>
+        </p:txBody>
+      </p:sp>
+      <p:sp>
+        <p:nvSpPr>
+          <p:cNvPr id="3" name="Content Placeholder 2"/>
           <p:cNvSpPr>
             <a:spLocks noGrp="1"/>
           </p:cNvSpPr>
           <p:nvPr>
-            <p:ph type="ftr" sz="quarter" idx="11"/>
+            <p:ph idx="1"/>
           </p:nvPr>
         </p:nvSpPr>
         <p:spPr>
           <a:xfrm>
-            <a:off x="3124200" y="6245225"/>
-            <a:ext cx="2895600" cy="476250"/>
+            <a:off x="457200" y="1752600"/>
+            <a:ext cx="8229600" cy="4373563"/>
           </a:xfrm>
         </p:spPr>
         <p:txBody>
@@ -5035,84 +5034,18 @@
           <a:lstStyle/>
           <a:p>
             <a:r>
-              <a:t>Copyright © 2006 Pearson Addison-Wesley. All rights reserved.
-</a:t>
-            </a:r>
-          </a:p>
-        </p:txBody>
-      </p:sp>
-      <p:sp>
-        <p:nvSpPr>
-          <p:cNvPr id="8" name="Title 7">
-            <a:extLst>
-              <a:ext uri="{FF2B5EF4-FFF2-40B4-BE49-F238E27FC236}">
-                <a16:creationId xmlns:a16="http://schemas.microsoft.com/office/drawing/2014/main" id="{6BF854B0-0598-4782-A999-501B8709ACB6}"/>
-              </a:ext>
-            </a:extLst>
-          </p:cNvPr>
-          <p:cNvSpPr>
-            <a:spLocks noGrp="1"/>
-          </p:cNvSpPr>
-          <p:nvPr>
-            <p:ph type="title"/>
-          </p:nvPr>
-        </p:nvSpPr>
-        <p:spPr/>
-        <p:txBody>
-          <a:bodyPr/>
-          <a:lstStyle/>
-          <a:p>
-            <a:endParaRPr lang="en-US"/>
-          </a:p>
-        </p:txBody>
-      </p:sp>
-      <p:sp>
-        <p:nvSpPr>
-          <p:cNvPr id="10" name="Content Placeholder 9">
-            <a:extLst>
-              <a:ext uri="{FF2B5EF4-FFF2-40B4-BE49-F238E27FC236}">
-                <a16:creationId xmlns:a16="http://schemas.microsoft.com/office/drawing/2014/main" id="{E3BE8B79-6C8E-47F6-992C-E084EB790A2B}"/>
-              </a:ext>
-            </a:extLst>
-          </p:cNvPr>
-          <p:cNvSpPr>
-            <a:spLocks noGrp="1"/>
-          </p:cNvSpPr>
-          <p:nvPr>
-            <p:ph sz="half" idx="1"/>
-          </p:nvPr>
-        </p:nvSpPr>
-        <p:spPr/>
-        <p:txBody>
-          <a:bodyPr/>
-          <a:lstStyle/>
-          <a:p>
-            <a:endParaRPr lang="en-US"/>
-          </a:p>
-        </p:txBody>
-      </p:sp>
-      <p:sp>
-        <p:nvSpPr>
-          <p:cNvPr id="12" name="Content Placeholder 11">
-            <a:extLst>
-              <a:ext uri="{FF2B5EF4-FFF2-40B4-BE49-F238E27FC236}">
-                <a16:creationId xmlns:a16="http://schemas.microsoft.com/office/drawing/2014/main" id="{1D21414F-9232-4FAB-95AD-45C0740FD960}"/>
-              </a:ext>
-            </a:extLst>
-          </p:cNvPr>
-          <p:cNvSpPr>
-            <a:spLocks noGrp="1"/>
-          </p:cNvSpPr>
-          <p:nvPr>
-            <p:ph sz="half" idx="2"/>
-          </p:nvPr>
-        </p:nvSpPr>
-        <p:spPr/>
-        <p:txBody>
-          <a:bodyPr/>
-          <a:lstStyle/>
-          <a:p>
-            <a:endParaRPr lang="en-US"/>
+              <a:t>Sep 30, 2002     Dow  7528</a:t>
+            </a:r>
+          </a:p>
+          <a:p>
+            <a:r>
+              <a:t>Jan. 5, 2004      Dow  10,568</a:t>
+            </a:r>
+          </a:p>
+          <a:p>
+            <a:r>
+              <a:t>Oct. 8, 2007      Dow   14093</a:t>
+            </a:r>
           </a:p>
         </p:txBody>
       </p:sp>
@@ -5141,9 +5074,9 @@
           <a:chExt cx="0" cy="0"/>
         </a:xfrm>
       </p:grpSpPr>
-      <p:sp xmlns:a="http://schemas.openxmlformats.org/drawingml/2006/main" xmlns:r="http://schemas.openxmlformats.org/officeDocument/2006/relationships" xmlns:p="http://schemas.openxmlformats.org/presentationml/2006/main">
-        <p:nvSpPr>
-          <p:cNvPr id="2" name=""/>
+      <p:sp>
+        <p:nvSpPr>
+          <p:cNvPr id="2" name="Title 1"/>
           <p:cNvSpPr>
             <a:spLocks noGrp="1"/>
           </p:cNvSpPr>
@@ -5162,15 +5095,14 @@
           <a:lstStyle/>
           <a:p>
             <a:r>
-              <a:rPr/>
-              <a:t>The Last Bear Market</a:t>
-            </a:r>
-          </a:p>
-        </p:txBody>
-      </p:sp>
-      <p:sp xmlns:a="http://schemas.openxmlformats.org/drawingml/2006/main" xmlns:r="http://schemas.openxmlformats.org/officeDocument/2006/relationships" xmlns:p="http://schemas.openxmlformats.org/presentationml/2006/main">
-        <p:nvSpPr>
-          <p:cNvPr id="3" name=""/>
+              <a:t>What do I do in a Bear Market</a:t>
+            </a:r>
+          </a:p>
+        </p:txBody>
+      </p:sp>
+      <p:sp>
+        <p:nvSpPr>
+          <p:cNvPr id="3" name="Content Placeholder 2"/>
           <p:cNvSpPr>
             <a:spLocks noGrp="1"/>
           </p:cNvSpPr>
@@ -5188,101 +5120,6 @@
           <a:bodyPr/>
           <a:lstStyle/>
           <a:p>
-            <a:pPr/>
-            <a:r>
-              <a:rPr/>
-              <a:t>Sep 30, 2002     Dow  7528</a:t>
-            </a:r>
-          </a:p>
-          <a:p>
-            <a:pPr/>
-            <a:r>
-              <a:rPr/>
-              <a:t>Jan. 5, 2004      Dow  10,568</a:t>
-            </a:r>
-          </a:p>
-          <a:p>
-            <a:pPr/>
-            <a:r>
-              <a:rPr/>
-              <a:t>Oct. 8, 2007      Dow   14093</a:t>
-            </a:r>
-          </a:p>
-        </p:txBody>
-      </p:sp>
-    </p:spTree>
-  </p:cSld>
-  <p:clrMapOvr>
-    <a:masterClrMapping/>
-  </p:clrMapOvr>
-</p:sld>
-</file>
-
-<file path=ppt/slides/slide4.xml><?xml version="1.0" encoding="utf-8"?>
-<p:sld xmlns:a="http://schemas.openxmlformats.org/drawingml/2006/main" xmlns:r="http://schemas.openxmlformats.org/officeDocument/2006/relationships" xmlns:p="http://schemas.openxmlformats.org/presentationml/2006/main">
-  <p:cSld>
-    <p:spTree>
-      <p:nvGrpSpPr>
-        <p:cNvPr id="1" name=""/>
-        <p:cNvGrpSpPr/>
-        <p:nvPr/>
-      </p:nvGrpSpPr>
-      <p:grpSpPr>
-        <a:xfrm>
-          <a:off x="0" y="0"/>
-          <a:ext cx="0" cy="0"/>
-          <a:chOff x="0" y="0"/>
-          <a:chExt cx="0" cy="0"/>
-        </a:xfrm>
-      </p:grpSpPr>
-      <p:sp xmlns:a="http://schemas.openxmlformats.org/drawingml/2006/main" xmlns:r="http://schemas.openxmlformats.org/officeDocument/2006/relationships" xmlns:p="http://schemas.openxmlformats.org/presentationml/2006/main">
-        <p:nvSpPr>
-          <p:cNvPr id="2" name=""/>
-          <p:cNvSpPr>
-            <a:spLocks noGrp="1"/>
-          </p:cNvSpPr>
-          <p:nvPr>
-            <p:ph type="title"/>
-          </p:nvPr>
-        </p:nvSpPr>
-        <p:spPr>
-          <a:xfrm>
-            <a:off x="457200" y="457200"/>
-            <a:ext cx="8229600" cy="1143000"/>
-          </a:xfrm>
-        </p:spPr>
-        <p:txBody>
-          <a:bodyPr/>
-          <a:lstStyle/>
-          <a:p>
-            <a:r>
-              <a:rPr/>
-              <a:t>What do I do in a Bear Market</a:t>
-            </a:r>
-          </a:p>
-        </p:txBody>
-      </p:sp>
-      <p:sp xmlns:a="http://schemas.openxmlformats.org/drawingml/2006/main" xmlns:r="http://schemas.openxmlformats.org/officeDocument/2006/relationships" xmlns:p="http://schemas.openxmlformats.org/presentationml/2006/main">
-        <p:nvSpPr>
-          <p:cNvPr id="3" name=""/>
-          <p:cNvSpPr>
-            <a:spLocks noGrp="1"/>
-          </p:cNvSpPr>
-          <p:nvPr>
-            <p:ph idx="1"/>
-          </p:nvPr>
-        </p:nvSpPr>
-        <p:spPr>
-          <a:xfrm>
-            <a:off x="457200" y="1752600"/>
-            <a:ext cx="8229600" cy="4373563"/>
-          </a:xfrm>
-        </p:spPr>
-        <p:txBody>
-          <a:bodyPr/>
-          <a:lstStyle/>
-          <a:p>
-            <a:pPr/>
             <a:r>
               <a:rPr sz="3200">
                 <a:solidFill>
@@ -5297,7 +5134,6 @@
             </a:r>
           </a:p>
           <a:p>
-            <a:pPr/>
             <a:r>
               <a:rPr sz="3200">
                 <a:solidFill>
@@ -5312,7 +5148,6 @@
             </a:r>
           </a:p>
           <a:p>
-            <a:pPr/>
             <a:r>
               <a:rPr sz="3200">
                 <a:solidFill>
@@ -5327,7 +5162,6 @@
             </a:r>
           </a:p>
           <a:p>
-            <a:pPr/>
             <a:r>
               <a:rPr sz="3200">
                 <a:solidFill>

</xml_diff>